<commit_message>
bangla type and timer function testing
</commit_message>
<xml_diff>
--- a/Mid Presentation 1433.pptx
+++ b/Mid Presentation 1433.pptx
@@ -216,7 +216,7 @@
           <a:p>
             <a:fld id="{1DDADBE3-1417-4B97-828D-BDCB742D4EDD}" type="datetimeFigureOut">
               <a:rPr lang="en-US" smtClean="0"/>
-              <a:t>09-Sep-23</a:t>
+              <a:t>10-Sep-23</a:t>
             </a:fld>
             <a:endParaRPr lang="en-US"/>
           </a:p>
@@ -700,7 +700,7 @@
           <a:p>
             <a:fld id="{9AB3A824-1A51-4B26-AD58-A6D8E14F6C04}" type="datetimeFigureOut">
               <a:rPr lang="en-US" dirty="0"/>
-              <a:t>09-Sep-23</a:t>
+              <a:t>10-Sep-23</a:t>
             </a:fld>
             <a:endParaRPr lang="en-US" dirty="0"/>
           </a:p>
@@ -1034,7 +1034,7 @@
           <a:p>
             <a:fld id="{D857E33E-8B18-4087-B112-809917729534}" type="datetimeFigureOut">
               <a:rPr lang="en-US" dirty="0"/>
-              <a:t>09-Sep-23</a:t>
+              <a:t>10-Sep-23</a:t>
             </a:fld>
             <a:endParaRPr lang="en-US" dirty="0"/>
           </a:p>
@@ -1336,7 +1336,7 @@
           <a:p>
             <a:fld id="{D3FFE419-2371-464F-8239-3959401C3561}" type="datetimeFigureOut">
               <a:rPr lang="en-US" dirty="0"/>
-              <a:t>09-Sep-23</a:t>
+              <a:t>10-Sep-23</a:t>
             </a:fld>
             <a:endParaRPr lang="en-US" dirty="0"/>
           </a:p>
@@ -1583,7 +1583,7 @@
           <a:p>
             <a:fld id="{97D162C4-EDD9-4389-A98B-B87ECEA2A816}" type="datetimeFigureOut">
               <a:rPr lang="en-US" dirty="0"/>
-              <a:t>09-Sep-23</a:t>
+              <a:t>10-Sep-23</a:t>
             </a:fld>
             <a:endParaRPr lang="en-US" dirty="0"/>
           </a:p>
@@ -1990,7 +1990,7 @@
           <a:p>
             <a:fld id="{3E5059C3-6A89-4494-99FF-5A4D6FFD50EB}" type="datetimeFigureOut">
               <a:rPr lang="en-US" dirty="0"/>
-              <a:t>09-Sep-23</a:t>
+              <a:t>10-Sep-23</a:t>
             </a:fld>
             <a:endParaRPr lang="en-US" dirty="0"/>
           </a:p>
@@ -2304,7 +2304,7 @@
           <a:p>
             <a:fld id="{CA954B2F-12DE-47F5-8894-472B206D2E1E}" type="datetimeFigureOut">
               <a:rPr lang="en-US" dirty="0"/>
-              <a:t>09-Sep-23</a:t>
+              <a:t>10-Sep-23</a:t>
             </a:fld>
             <a:endParaRPr lang="en-US" dirty="0"/>
           </a:p>
@@ -2848,7 +2848,7 @@
           <a:p>
             <a:fld id="{3F30E46F-7819-4ACF-B48B-48222C2ACC88}" type="datetimeFigureOut">
               <a:rPr lang="en-US" dirty="0"/>
-              <a:t>09-Sep-23</a:t>
+              <a:t>10-Sep-23</a:t>
             </a:fld>
             <a:endParaRPr lang="en-US" dirty="0"/>
           </a:p>
@@ -3043,7 +3043,7 @@
           <a:p>
             <a:fld id="{1FAF3416-4057-4DAA-829D-4CA07428D088}" type="datetimeFigureOut">
               <a:rPr lang="en-US" dirty="0"/>
-              <a:t>09-Sep-23</a:t>
+              <a:t>10-Sep-23</a:t>
             </a:fld>
             <a:endParaRPr lang="en-US" dirty="0"/>
           </a:p>
@@ -3256,7 +3256,7 @@
           <a:p>
             <a:fld id="{921D9284-D300-4297-87F7-E791DCC15DB1}" type="datetimeFigureOut">
               <a:rPr lang="en-US" dirty="0"/>
-              <a:t>09-Sep-23</a:t>
+              <a:t>10-Sep-23</a:t>
             </a:fld>
             <a:endParaRPr lang="en-US" dirty="0"/>
           </a:p>
@@ -3625,7 +3625,7 @@
           <a:p>
             <a:fld id="{37D525BB-DA17-4BA0-B3C8-3AC3ABC827E6}" type="datetimeFigureOut">
               <a:rPr lang="en-US" dirty="0"/>
-              <a:t>09-Sep-23</a:t>
+              <a:t>10-Sep-23</a:t>
             </a:fld>
             <a:endParaRPr lang="en-US" dirty="0"/>
           </a:p>
@@ -4028,7 +4028,7 @@
           <a:p>
             <a:fld id="{B16C4C9A-3960-41CF-A4E9-2A8FB932454B}" type="datetimeFigureOut">
               <a:rPr lang="en-US" dirty="0"/>
-              <a:t>09-Sep-23</a:t>
+              <a:t>10-Sep-23</a:t>
             </a:fld>
             <a:endParaRPr lang="en-US" dirty="0"/>
           </a:p>
@@ -4339,7 +4339,7 @@
           <a:p>
             <a:fld id="{3CBC1C18-307B-4F68-A007-B5B542270E8D}" type="datetimeFigureOut">
               <a:rPr lang="en-US" dirty="0"/>
-              <a:t>09-Sep-23</a:t>
+              <a:t>10-Sep-23</a:t>
             </a:fld>
             <a:endParaRPr lang="en-US" dirty="0"/>
           </a:p>
@@ -5071,6 +5071,45 @@
           </a:p>
         </p:txBody>
       </p:sp>
+      <p:sp>
+        <p:nvSpPr>
+          <p:cNvPr id="5" name="TextBox 4">
+            <a:extLst>
+              <a:ext uri="{FF2B5EF4-FFF2-40B4-BE49-F238E27FC236}">
+                <a16:creationId xmlns:a16="http://schemas.microsoft.com/office/drawing/2014/main" id="{584DE1EA-F844-4EAA-AEEE-B04ED1AFC13C}"/>
+              </a:ext>
+            </a:extLst>
+          </p:cNvPr>
+          <p:cNvSpPr txBox="1"/>
+          <p:nvPr/>
+        </p:nvSpPr>
+        <p:spPr>
+          <a:xfrm>
+            <a:off x="119270" y="288235"/>
+            <a:ext cx="765313" cy="769441"/>
+          </a:xfrm>
+          <a:prstGeom prst="rect">
+            <a:avLst/>
+          </a:prstGeom>
+          <a:noFill/>
+        </p:spPr>
+        <p:txBody>
+          <a:bodyPr wrap="square" rtlCol="0">
+            <a:spAutoFit/>
+          </a:bodyPr>
+          <a:lstStyle/>
+          <a:p>
+            <a:r>
+              <a:rPr lang="en-US" sz="4400" dirty="0">
+                <a:latin typeface="Arial Rounded MT Bold" panose="020F0704030504030204" pitchFamily="34" charset="0"/>
+                <a:ea typeface="+mj-ea"/>
+                <a:cs typeface="+mj-cs"/>
+              </a:rPr>
+              <a:t>1</a:t>
+            </a:r>
+          </a:p>
+        </p:txBody>
+      </p:sp>
     </p:spTree>
     <p:extLst>
       <p:ext uri="{BB962C8B-B14F-4D97-AF65-F5344CB8AC3E}">
@@ -5269,6 +5308,45 @@
           </a:prstGeom>
         </p:spPr>
       </p:pic>
+      <p:sp>
+        <p:nvSpPr>
+          <p:cNvPr id="8" name="TextBox 7">
+            <a:extLst>
+              <a:ext uri="{FF2B5EF4-FFF2-40B4-BE49-F238E27FC236}">
+                <a16:creationId xmlns:a16="http://schemas.microsoft.com/office/drawing/2014/main" id="{A95AE6E8-C3AA-44FF-B975-D5AFDBCD2345}"/>
+              </a:ext>
+            </a:extLst>
+          </p:cNvPr>
+          <p:cNvSpPr txBox="1"/>
+          <p:nvPr/>
+        </p:nvSpPr>
+        <p:spPr>
+          <a:xfrm>
+            <a:off x="119270" y="288235"/>
+            <a:ext cx="983054" cy="769441"/>
+          </a:xfrm>
+          <a:prstGeom prst="rect">
+            <a:avLst/>
+          </a:prstGeom>
+          <a:noFill/>
+        </p:spPr>
+        <p:txBody>
+          <a:bodyPr wrap="square" rtlCol="0">
+            <a:spAutoFit/>
+          </a:bodyPr>
+          <a:lstStyle/>
+          <a:p>
+            <a:r>
+              <a:rPr lang="en-US" sz="4400" dirty="0">
+                <a:latin typeface="Arial Rounded MT Bold" panose="020F0704030504030204" pitchFamily="34" charset="0"/>
+                <a:ea typeface="+mj-ea"/>
+                <a:cs typeface="+mj-cs"/>
+              </a:rPr>
+              <a:t>10</a:t>
+            </a:r>
+          </a:p>
+        </p:txBody>
+      </p:sp>
     </p:spTree>
     <p:extLst>
       <p:ext uri="{BB962C8B-B14F-4D97-AF65-F5344CB8AC3E}">
@@ -5511,6 +5589,45 @@
           </a:p>
         </p:txBody>
       </p:sp>
+      <p:sp>
+        <p:nvSpPr>
+          <p:cNvPr id="6" name="TextBox 5">
+            <a:extLst>
+              <a:ext uri="{FF2B5EF4-FFF2-40B4-BE49-F238E27FC236}">
+                <a16:creationId xmlns:a16="http://schemas.microsoft.com/office/drawing/2014/main" id="{C12D9209-7467-4CD9-A0BA-0F06E7C3C2F8}"/>
+              </a:ext>
+            </a:extLst>
+          </p:cNvPr>
+          <p:cNvSpPr txBox="1"/>
+          <p:nvPr/>
+        </p:nvSpPr>
+        <p:spPr>
+          <a:xfrm>
+            <a:off x="119270" y="288235"/>
+            <a:ext cx="1023730" cy="769441"/>
+          </a:xfrm>
+          <a:prstGeom prst="rect">
+            <a:avLst/>
+          </a:prstGeom>
+          <a:noFill/>
+        </p:spPr>
+        <p:txBody>
+          <a:bodyPr wrap="square" rtlCol="0">
+            <a:spAutoFit/>
+          </a:bodyPr>
+          <a:lstStyle/>
+          <a:p>
+            <a:r>
+              <a:rPr lang="en-US" sz="4400" dirty="0">
+                <a:latin typeface="Arial Rounded MT Bold" panose="020F0704030504030204" pitchFamily="34" charset="0"/>
+                <a:ea typeface="+mj-ea"/>
+                <a:cs typeface="+mj-cs"/>
+              </a:rPr>
+              <a:t>11</a:t>
+            </a:r>
+          </a:p>
+        </p:txBody>
+      </p:sp>
     </p:spTree>
     <p:extLst>
       <p:ext uri="{BB962C8B-B14F-4D97-AF65-F5344CB8AC3E}">
@@ -5650,6 +5767,45 @@
           </a:prstGeom>
         </p:spPr>
       </p:pic>
+      <p:sp>
+        <p:nvSpPr>
+          <p:cNvPr id="5" name="TextBox 4">
+            <a:extLst>
+              <a:ext uri="{FF2B5EF4-FFF2-40B4-BE49-F238E27FC236}">
+                <a16:creationId xmlns:a16="http://schemas.microsoft.com/office/drawing/2014/main" id="{D9334F62-DE90-4886-B058-6541719E18FC}"/>
+              </a:ext>
+            </a:extLst>
+          </p:cNvPr>
+          <p:cNvSpPr txBox="1"/>
+          <p:nvPr/>
+        </p:nvSpPr>
+        <p:spPr>
+          <a:xfrm>
+            <a:off x="119270" y="288235"/>
+            <a:ext cx="1093305" cy="769441"/>
+          </a:xfrm>
+          <a:prstGeom prst="rect">
+            <a:avLst/>
+          </a:prstGeom>
+          <a:noFill/>
+        </p:spPr>
+        <p:txBody>
+          <a:bodyPr wrap="square" rtlCol="0">
+            <a:spAutoFit/>
+          </a:bodyPr>
+          <a:lstStyle/>
+          <a:p>
+            <a:r>
+              <a:rPr lang="en-US" sz="4400" dirty="0">
+                <a:latin typeface="Arial Rounded MT Bold" panose="020F0704030504030204" pitchFamily="34" charset="0"/>
+                <a:ea typeface="+mj-ea"/>
+                <a:cs typeface="+mj-cs"/>
+              </a:rPr>
+              <a:t>12</a:t>
+            </a:r>
+          </a:p>
+        </p:txBody>
+      </p:sp>
     </p:spTree>
     <p:extLst>
       <p:ext uri="{BB962C8B-B14F-4D97-AF65-F5344CB8AC3E}">
@@ -5853,6 +6009,45 @@
           </a:prstGeom>
         </p:spPr>
       </p:pic>
+      <p:sp>
+        <p:nvSpPr>
+          <p:cNvPr id="6" name="TextBox 5">
+            <a:extLst>
+              <a:ext uri="{FF2B5EF4-FFF2-40B4-BE49-F238E27FC236}">
+                <a16:creationId xmlns:a16="http://schemas.microsoft.com/office/drawing/2014/main" id="{8B0877A3-41CD-4B69-A5A2-19BC7FCE3854}"/>
+              </a:ext>
+            </a:extLst>
+          </p:cNvPr>
+          <p:cNvSpPr txBox="1"/>
+          <p:nvPr/>
+        </p:nvSpPr>
+        <p:spPr>
+          <a:xfrm>
+            <a:off x="119270" y="288235"/>
+            <a:ext cx="954156" cy="769441"/>
+          </a:xfrm>
+          <a:prstGeom prst="rect">
+            <a:avLst/>
+          </a:prstGeom>
+          <a:noFill/>
+        </p:spPr>
+        <p:txBody>
+          <a:bodyPr wrap="square" rtlCol="0">
+            <a:spAutoFit/>
+          </a:bodyPr>
+          <a:lstStyle/>
+          <a:p>
+            <a:r>
+              <a:rPr lang="en-US" sz="4400" dirty="0">
+                <a:latin typeface="Arial Rounded MT Bold" panose="020F0704030504030204" pitchFamily="34" charset="0"/>
+                <a:ea typeface="+mj-ea"/>
+                <a:cs typeface="+mj-cs"/>
+              </a:rPr>
+              <a:t>13</a:t>
+            </a:r>
+          </a:p>
+        </p:txBody>
+      </p:sp>
     </p:spTree>
     <p:extLst>
       <p:ext uri="{BB962C8B-B14F-4D97-AF65-F5344CB8AC3E}">
@@ -5922,6 +6117,45 @@
           </a:p>
         </p:txBody>
       </p:sp>
+      <p:sp>
+        <p:nvSpPr>
+          <p:cNvPr id="4" name="TextBox 3">
+            <a:extLst>
+              <a:ext uri="{FF2B5EF4-FFF2-40B4-BE49-F238E27FC236}">
+                <a16:creationId xmlns:a16="http://schemas.microsoft.com/office/drawing/2014/main" id="{B04C1840-0925-445C-8568-7553FA6EDD88}"/>
+              </a:ext>
+            </a:extLst>
+          </p:cNvPr>
+          <p:cNvSpPr txBox="1"/>
+          <p:nvPr/>
+        </p:nvSpPr>
+        <p:spPr>
+          <a:xfrm>
+            <a:off x="119270" y="288235"/>
+            <a:ext cx="954156" cy="769441"/>
+          </a:xfrm>
+          <a:prstGeom prst="rect">
+            <a:avLst/>
+          </a:prstGeom>
+          <a:noFill/>
+        </p:spPr>
+        <p:txBody>
+          <a:bodyPr wrap="square" rtlCol="0">
+            <a:spAutoFit/>
+          </a:bodyPr>
+          <a:lstStyle/>
+          <a:p>
+            <a:r>
+              <a:rPr lang="en-US" sz="4400" dirty="0">
+                <a:latin typeface="Arial Rounded MT Bold" panose="020F0704030504030204" pitchFamily="34" charset="0"/>
+                <a:ea typeface="+mj-ea"/>
+                <a:cs typeface="+mj-cs"/>
+              </a:rPr>
+              <a:t>14</a:t>
+            </a:r>
+          </a:p>
+        </p:txBody>
+      </p:sp>
     </p:spTree>
     <p:extLst>
       <p:ext uri="{BB962C8B-B14F-4D97-AF65-F5344CB8AC3E}">
@@ -6099,6 +6333,45 @@
           </a:p>
         </p:txBody>
       </p:sp>
+      <p:sp>
+        <p:nvSpPr>
+          <p:cNvPr id="4" name="TextBox 3">
+            <a:extLst>
+              <a:ext uri="{FF2B5EF4-FFF2-40B4-BE49-F238E27FC236}">
+                <a16:creationId xmlns:a16="http://schemas.microsoft.com/office/drawing/2014/main" id="{E3F5536C-FA0C-411B-AF5A-05E7B2A3B239}"/>
+              </a:ext>
+            </a:extLst>
+          </p:cNvPr>
+          <p:cNvSpPr txBox="1"/>
+          <p:nvPr/>
+        </p:nvSpPr>
+        <p:spPr>
+          <a:xfrm>
+            <a:off x="119270" y="288235"/>
+            <a:ext cx="954156" cy="769441"/>
+          </a:xfrm>
+          <a:prstGeom prst="rect">
+            <a:avLst/>
+          </a:prstGeom>
+          <a:noFill/>
+        </p:spPr>
+        <p:txBody>
+          <a:bodyPr wrap="square" rtlCol="0">
+            <a:spAutoFit/>
+          </a:bodyPr>
+          <a:lstStyle/>
+          <a:p>
+            <a:r>
+              <a:rPr lang="en-US" sz="4400" dirty="0">
+                <a:latin typeface="Arial Rounded MT Bold" panose="020F0704030504030204" pitchFamily="34" charset="0"/>
+                <a:ea typeface="+mj-ea"/>
+                <a:cs typeface="+mj-cs"/>
+              </a:rPr>
+              <a:t>15</a:t>
+            </a:r>
+          </a:p>
+        </p:txBody>
+      </p:sp>
     </p:spTree>
     <p:extLst>
       <p:ext uri="{BB962C8B-B14F-4D97-AF65-F5344CB8AC3E}">
@@ -6271,6 +6544,45 @@
           </a:p>
         </p:txBody>
       </p:sp>
+      <p:sp>
+        <p:nvSpPr>
+          <p:cNvPr id="4" name="TextBox 3">
+            <a:extLst>
+              <a:ext uri="{FF2B5EF4-FFF2-40B4-BE49-F238E27FC236}">
+                <a16:creationId xmlns:a16="http://schemas.microsoft.com/office/drawing/2014/main" id="{5C6CE525-AA24-4BE7-8D16-B2036DE5F9CD}"/>
+              </a:ext>
+            </a:extLst>
+          </p:cNvPr>
+          <p:cNvSpPr txBox="1"/>
+          <p:nvPr/>
+        </p:nvSpPr>
+        <p:spPr>
+          <a:xfrm>
+            <a:off x="119270" y="288235"/>
+            <a:ext cx="954156" cy="769441"/>
+          </a:xfrm>
+          <a:prstGeom prst="rect">
+            <a:avLst/>
+          </a:prstGeom>
+          <a:noFill/>
+        </p:spPr>
+        <p:txBody>
+          <a:bodyPr wrap="square" rtlCol="0">
+            <a:spAutoFit/>
+          </a:bodyPr>
+          <a:lstStyle/>
+          <a:p>
+            <a:r>
+              <a:rPr lang="en-US" sz="4400" dirty="0">
+                <a:latin typeface="Arial Rounded MT Bold" panose="020F0704030504030204" pitchFamily="34" charset="0"/>
+                <a:ea typeface="+mj-ea"/>
+                <a:cs typeface="+mj-cs"/>
+              </a:rPr>
+              <a:t>16</a:t>
+            </a:r>
+          </a:p>
+        </p:txBody>
+      </p:sp>
     </p:spTree>
     <p:extLst>
       <p:ext uri="{BB962C8B-B14F-4D97-AF65-F5344CB8AC3E}">
@@ -6440,6 +6752,45 @@
           </a:p>
         </p:txBody>
       </p:sp>
+      <p:sp>
+        <p:nvSpPr>
+          <p:cNvPr id="4" name="TextBox 3">
+            <a:extLst>
+              <a:ext uri="{FF2B5EF4-FFF2-40B4-BE49-F238E27FC236}">
+                <a16:creationId xmlns:a16="http://schemas.microsoft.com/office/drawing/2014/main" id="{3401B413-1F72-4909-82C9-6A64627BF4B6}"/>
+              </a:ext>
+            </a:extLst>
+          </p:cNvPr>
+          <p:cNvSpPr txBox="1"/>
+          <p:nvPr/>
+        </p:nvSpPr>
+        <p:spPr>
+          <a:xfrm>
+            <a:off x="119270" y="288235"/>
+            <a:ext cx="954156" cy="769441"/>
+          </a:xfrm>
+          <a:prstGeom prst="rect">
+            <a:avLst/>
+          </a:prstGeom>
+          <a:noFill/>
+        </p:spPr>
+        <p:txBody>
+          <a:bodyPr wrap="square" rtlCol="0">
+            <a:spAutoFit/>
+          </a:bodyPr>
+          <a:lstStyle/>
+          <a:p>
+            <a:r>
+              <a:rPr lang="en-US" sz="4400" dirty="0">
+                <a:latin typeface="Arial Rounded MT Bold" panose="020F0704030504030204" pitchFamily="34" charset="0"/>
+                <a:ea typeface="+mj-ea"/>
+                <a:cs typeface="+mj-cs"/>
+              </a:rPr>
+              <a:t>17</a:t>
+            </a:r>
+          </a:p>
+        </p:txBody>
+      </p:sp>
     </p:spTree>
     <p:extLst>
       <p:ext uri="{BB962C8B-B14F-4D97-AF65-F5344CB8AC3E}">
@@ -6592,6 +6943,45 @@
           </a:p>
         </p:txBody>
       </p:sp>
+      <p:sp>
+        <p:nvSpPr>
+          <p:cNvPr id="4" name="TextBox 3">
+            <a:extLst>
+              <a:ext uri="{FF2B5EF4-FFF2-40B4-BE49-F238E27FC236}">
+                <a16:creationId xmlns:a16="http://schemas.microsoft.com/office/drawing/2014/main" id="{9F05C301-ECCF-4F62-AD0E-5CD79980A7F5}"/>
+              </a:ext>
+            </a:extLst>
+          </p:cNvPr>
+          <p:cNvSpPr txBox="1"/>
+          <p:nvPr/>
+        </p:nvSpPr>
+        <p:spPr>
+          <a:xfrm>
+            <a:off x="119270" y="288235"/>
+            <a:ext cx="954156" cy="769441"/>
+          </a:xfrm>
+          <a:prstGeom prst="rect">
+            <a:avLst/>
+          </a:prstGeom>
+          <a:noFill/>
+        </p:spPr>
+        <p:txBody>
+          <a:bodyPr wrap="square" rtlCol="0">
+            <a:spAutoFit/>
+          </a:bodyPr>
+          <a:lstStyle/>
+          <a:p>
+            <a:r>
+              <a:rPr lang="en-US" sz="4400" dirty="0">
+                <a:latin typeface="Arial Rounded MT Bold" panose="020F0704030504030204" pitchFamily="34" charset="0"/>
+                <a:ea typeface="+mj-ea"/>
+                <a:cs typeface="+mj-cs"/>
+              </a:rPr>
+              <a:t>18</a:t>
+            </a:r>
+          </a:p>
+        </p:txBody>
+      </p:sp>
     </p:spTree>
     <p:extLst>
       <p:ext uri="{BB962C8B-B14F-4D97-AF65-F5344CB8AC3E}">
@@ -6755,6 +7145,45 @@
           </a:p>
         </p:txBody>
       </p:sp>
+      <p:sp>
+        <p:nvSpPr>
+          <p:cNvPr id="5" name="TextBox 4">
+            <a:extLst>
+              <a:ext uri="{FF2B5EF4-FFF2-40B4-BE49-F238E27FC236}">
+                <a16:creationId xmlns:a16="http://schemas.microsoft.com/office/drawing/2014/main" id="{68DBF224-6274-4CDF-9E2F-BB34B8399041}"/>
+              </a:ext>
+            </a:extLst>
+          </p:cNvPr>
+          <p:cNvSpPr txBox="1"/>
+          <p:nvPr/>
+        </p:nvSpPr>
+        <p:spPr>
+          <a:xfrm>
+            <a:off x="119270" y="288235"/>
+            <a:ext cx="954156" cy="769441"/>
+          </a:xfrm>
+          <a:prstGeom prst="rect">
+            <a:avLst/>
+          </a:prstGeom>
+          <a:noFill/>
+        </p:spPr>
+        <p:txBody>
+          <a:bodyPr wrap="square" rtlCol="0">
+            <a:spAutoFit/>
+          </a:bodyPr>
+          <a:lstStyle/>
+          <a:p>
+            <a:r>
+              <a:rPr lang="en-US" sz="4400" dirty="0">
+                <a:latin typeface="Arial Rounded MT Bold" panose="020F0704030504030204" pitchFamily="34" charset="0"/>
+                <a:ea typeface="+mj-ea"/>
+                <a:cs typeface="+mj-cs"/>
+              </a:rPr>
+              <a:t>19</a:t>
+            </a:r>
+          </a:p>
+        </p:txBody>
+      </p:sp>
     </p:spTree>
     <p:extLst>
       <p:ext uri="{BB962C8B-B14F-4D97-AF65-F5344CB8AC3E}">
@@ -6898,6 +7327,45 @@
           </a:p>
         </p:txBody>
       </p:sp>
+      <p:sp>
+        <p:nvSpPr>
+          <p:cNvPr id="8" name="TextBox 7">
+            <a:extLst>
+              <a:ext uri="{FF2B5EF4-FFF2-40B4-BE49-F238E27FC236}">
+                <a16:creationId xmlns:a16="http://schemas.microsoft.com/office/drawing/2014/main" id="{9BA53D19-C03E-4098-8ABE-E5BA0A41432B}"/>
+              </a:ext>
+            </a:extLst>
+          </p:cNvPr>
+          <p:cNvSpPr txBox="1"/>
+          <p:nvPr/>
+        </p:nvSpPr>
+        <p:spPr>
+          <a:xfrm>
+            <a:off x="119270" y="288235"/>
+            <a:ext cx="765313" cy="769441"/>
+          </a:xfrm>
+          <a:prstGeom prst="rect">
+            <a:avLst/>
+          </a:prstGeom>
+          <a:noFill/>
+        </p:spPr>
+        <p:txBody>
+          <a:bodyPr wrap="square" rtlCol="0">
+            <a:spAutoFit/>
+          </a:bodyPr>
+          <a:lstStyle/>
+          <a:p>
+            <a:r>
+              <a:rPr lang="en-US" sz="4400" dirty="0">
+                <a:latin typeface="Arial Rounded MT Bold" panose="020F0704030504030204" pitchFamily="34" charset="0"/>
+                <a:ea typeface="+mj-ea"/>
+                <a:cs typeface="+mj-cs"/>
+              </a:rPr>
+              <a:t>2</a:t>
+            </a:r>
+          </a:p>
+        </p:txBody>
+      </p:sp>
     </p:spTree>
     <p:extLst>
       <p:ext uri="{BB962C8B-B14F-4D97-AF65-F5344CB8AC3E}">
@@ -6981,6 +7449,45 @@
           </a:p>
         </p:txBody>
       </p:sp>
+      <p:sp>
+        <p:nvSpPr>
+          <p:cNvPr id="3" name="TextBox 2">
+            <a:extLst>
+              <a:ext uri="{FF2B5EF4-FFF2-40B4-BE49-F238E27FC236}">
+                <a16:creationId xmlns:a16="http://schemas.microsoft.com/office/drawing/2014/main" id="{95BA0B30-3AD0-46F5-B442-FC70006A4F8A}"/>
+              </a:ext>
+            </a:extLst>
+          </p:cNvPr>
+          <p:cNvSpPr txBox="1"/>
+          <p:nvPr/>
+        </p:nvSpPr>
+        <p:spPr>
+          <a:xfrm>
+            <a:off x="119270" y="288235"/>
+            <a:ext cx="954156" cy="769441"/>
+          </a:xfrm>
+          <a:prstGeom prst="rect">
+            <a:avLst/>
+          </a:prstGeom>
+          <a:noFill/>
+        </p:spPr>
+        <p:txBody>
+          <a:bodyPr wrap="square" rtlCol="0">
+            <a:spAutoFit/>
+          </a:bodyPr>
+          <a:lstStyle/>
+          <a:p>
+            <a:r>
+              <a:rPr lang="en-US" sz="4400" dirty="0">
+                <a:latin typeface="Arial Rounded MT Bold" panose="020F0704030504030204" pitchFamily="34" charset="0"/>
+                <a:ea typeface="+mj-ea"/>
+                <a:cs typeface="+mj-cs"/>
+              </a:rPr>
+              <a:t>20</a:t>
+            </a:r>
+          </a:p>
+        </p:txBody>
+      </p:sp>
     </p:spTree>
     <p:extLst>
       <p:ext uri="{BB962C8B-B14F-4D97-AF65-F5344CB8AC3E}">
@@ -7186,6 +7693,45 @@
           </a:p>
         </p:txBody>
       </p:sp>
+      <p:sp>
+        <p:nvSpPr>
+          <p:cNvPr id="4" name="TextBox 3">
+            <a:extLst>
+              <a:ext uri="{FF2B5EF4-FFF2-40B4-BE49-F238E27FC236}">
+                <a16:creationId xmlns:a16="http://schemas.microsoft.com/office/drawing/2014/main" id="{22E40C26-4331-4115-8AD5-E015493AFFDB}"/>
+              </a:ext>
+            </a:extLst>
+          </p:cNvPr>
+          <p:cNvSpPr txBox="1"/>
+          <p:nvPr/>
+        </p:nvSpPr>
+        <p:spPr>
+          <a:xfrm>
+            <a:off x="119270" y="288235"/>
+            <a:ext cx="765313" cy="769441"/>
+          </a:xfrm>
+          <a:prstGeom prst="rect">
+            <a:avLst/>
+          </a:prstGeom>
+          <a:noFill/>
+        </p:spPr>
+        <p:txBody>
+          <a:bodyPr wrap="square" rtlCol="0">
+            <a:spAutoFit/>
+          </a:bodyPr>
+          <a:lstStyle/>
+          <a:p>
+            <a:r>
+              <a:rPr lang="en-US" sz="4400" dirty="0">
+                <a:latin typeface="Arial Rounded MT Bold" panose="020F0704030504030204" pitchFamily="34" charset="0"/>
+                <a:ea typeface="+mj-ea"/>
+                <a:cs typeface="+mj-cs"/>
+              </a:rPr>
+              <a:t>3</a:t>
+            </a:r>
+          </a:p>
+        </p:txBody>
+      </p:sp>
     </p:spTree>
     <p:extLst>
       <p:ext uri="{BB962C8B-B14F-4D97-AF65-F5344CB8AC3E}">
@@ -7363,6 +7909,45 @@
           </a:p>
         </p:txBody>
       </p:sp>
+      <p:sp>
+        <p:nvSpPr>
+          <p:cNvPr id="5" name="TextBox 4">
+            <a:extLst>
+              <a:ext uri="{FF2B5EF4-FFF2-40B4-BE49-F238E27FC236}">
+                <a16:creationId xmlns:a16="http://schemas.microsoft.com/office/drawing/2014/main" id="{75E45578-3EDC-4AE0-8B46-6FF84EF5AED3}"/>
+              </a:ext>
+            </a:extLst>
+          </p:cNvPr>
+          <p:cNvSpPr txBox="1"/>
+          <p:nvPr/>
+        </p:nvSpPr>
+        <p:spPr>
+          <a:xfrm>
+            <a:off x="119270" y="288235"/>
+            <a:ext cx="765313" cy="769441"/>
+          </a:xfrm>
+          <a:prstGeom prst="rect">
+            <a:avLst/>
+          </a:prstGeom>
+          <a:noFill/>
+        </p:spPr>
+        <p:txBody>
+          <a:bodyPr wrap="square" rtlCol="0">
+            <a:spAutoFit/>
+          </a:bodyPr>
+          <a:lstStyle/>
+          <a:p>
+            <a:r>
+              <a:rPr lang="en-US" sz="4400" dirty="0">
+                <a:latin typeface="Arial Rounded MT Bold" panose="020F0704030504030204" pitchFamily="34" charset="0"/>
+                <a:ea typeface="+mj-ea"/>
+                <a:cs typeface="+mj-cs"/>
+              </a:rPr>
+              <a:t>4</a:t>
+            </a:r>
+          </a:p>
+        </p:txBody>
+      </p:sp>
     </p:spTree>
     <p:extLst>
       <p:ext uri="{BB962C8B-B14F-4D97-AF65-F5344CB8AC3E}">
@@ -7543,6 +8128,45 @@
           </a:p>
         </p:txBody>
       </p:sp>
+      <p:sp>
+        <p:nvSpPr>
+          <p:cNvPr id="5" name="TextBox 4">
+            <a:extLst>
+              <a:ext uri="{FF2B5EF4-FFF2-40B4-BE49-F238E27FC236}">
+                <a16:creationId xmlns:a16="http://schemas.microsoft.com/office/drawing/2014/main" id="{1F38ACE8-E925-4F70-B299-F79C99B14B8F}"/>
+              </a:ext>
+            </a:extLst>
+          </p:cNvPr>
+          <p:cNvSpPr txBox="1"/>
+          <p:nvPr/>
+        </p:nvSpPr>
+        <p:spPr>
+          <a:xfrm>
+            <a:off x="119270" y="288235"/>
+            <a:ext cx="765313" cy="769441"/>
+          </a:xfrm>
+          <a:prstGeom prst="rect">
+            <a:avLst/>
+          </a:prstGeom>
+          <a:noFill/>
+        </p:spPr>
+        <p:txBody>
+          <a:bodyPr wrap="square" rtlCol="0">
+            <a:spAutoFit/>
+          </a:bodyPr>
+          <a:lstStyle/>
+          <a:p>
+            <a:r>
+              <a:rPr lang="en-US" sz="4400" dirty="0">
+                <a:latin typeface="Arial Rounded MT Bold" panose="020F0704030504030204" pitchFamily="34" charset="0"/>
+                <a:ea typeface="+mj-ea"/>
+                <a:cs typeface="+mj-cs"/>
+              </a:rPr>
+              <a:t>5</a:t>
+            </a:r>
+          </a:p>
+        </p:txBody>
+      </p:sp>
     </p:spTree>
     <p:extLst>
       <p:ext uri="{BB962C8B-B14F-4D97-AF65-F5344CB8AC3E}">
@@ -7611,6 +8235,45 @@
           </a:p>
         </p:txBody>
       </p:sp>
+      <p:sp>
+        <p:nvSpPr>
+          <p:cNvPr id="3" name="TextBox 2">
+            <a:extLst>
+              <a:ext uri="{FF2B5EF4-FFF2-40B4-BE49-F238E27FC236}">
+                <a16:creationId xmlns:a16="http://schemas.microsoft.com/office/drawing/2014/main" id="{0188B9F3-AD97-4B17-8E57-2208FFB2941C}"/>
+              </a:ext>
+            </a:extLst>
+          </p:cNvPr>
+          <p:cNvSpPr txBox="1"/>
+          <p:nvPr/>
+        </p:nvSpPr>
+        <p:spPr>
+          <a:xfrm>
+            <a:off x="119270" y="288235"/>
+            <a:ext cx="765313" cy="769441"/>
+          </a:xfrm>
+          <a:prstGeom prst="rect">
+            <a:avLst/>
+          </a:prstGeom>
+          <a:noFill/>
+        </p:spPr>
+        <p:txBody>
+          <a:bodyPr wrap="square" rtlCol="0">
+            <a:spAutoFit/>
+          </a:bodyPr>
+          <a:lstStyle/>
+          <a:p>
+            <a:r>
+              <a:rPr lang="en-US" sz="4400" dirty="0">
+                <a:latin typeface="Arial Rounded MT Bold" panose="020F0704030504030204" pitchFamily="34" charset="0"/>
+                <a:ea typeface="+mj-ea"/>
+                <a:cs typeface="+mj-cs"/>
+              </a:rPr>
+              <a:t>6</a:t>
+            </a:r>
+          </a:p>
+        </p:txBody>
+      </p:sp>
     </p:spTree>
     <p:extLst>
       <p:ext uri="{BB962C8B-B14F-4D97-AF65-F5344CB8AC3E}">
@@ -7745,6 +8408,45 @@
           </a:prstGeom>
         </p:spPr>
       </p:pic>
+      <p:sp>
+        <p:nvSpPr>
+          <p:cNvPr id="5" name="TextBox 4">
+            <a:extLst>
+              <a:ext uri="{FF2B5EF4-FFF2-40B4-BE49-F238E27FC236}">
+                <a16:creationId xmlns:a16="http://schemas.microsoft.com/office/drawing/2014/main" id="{C11F78E2-29C0-4FB0-9736-FE2A12BFE149}"/>
+              </a:ext>
+            </a:extLst>
+          </p:cNvPr>
+          <p:cNvSpPr txBox="1"/>
+          <p:nvPr/>
+        </p:nvSpPr>
+        <p:spPr>
+          <a:xfrm>
+            <a:off x="119270" y="288235"/>
+            <a:ext cx="765313" cy="769441"/>
+          </a:xfrm>
+          <a:prstGeom prst="rect">
+            <a:avLst/>
+          </a:prstGeom>
+          <a:noFill/>
+        </p:spPr>
+        <p:txBody>
+          <a:bodyPr wrap="square" rtlCol="0">
+            <a:spAutoFit/>
+          </a:bodyPr>
+          <a:lstStyle/>
+          <a:p>
+            <a:r>
+              <a:rPr lang="en-US" sz="4400" dirty="0">
+                <a:latin typeface="Arial Rounded MT Bold" panose="020F0704030504030204" pitchFamily="34" charset="0"/>
+                <a:ea typeface="+mj-ea"/>
+                <a:cs typeface="+mj-cs"/>
+              </a:rPr>
+              <a:t>7</a:t>
+            </a:r>
+          </a:p>
+        </p:txBody>
+      </p:sp>
     </p:spTree>
     <p:extLst>
       <p:ext uri="{BB962C8B-B14F-4D97-AF65-F5344CB8AC3E}">
@@ -7899,6 +8601,45 @@
           </a:prstGeom>
         </p:spPr>
       </p:pic>
+      <p:sp>
+        <p:nvSpPr>
+          <p:cNvPr id="5" name="TextBox 4">
+            <a:extLst>
+              <a:ext uri="{FF2B5EF4-FFF2-40B4-BE49-F238E27FC236}">
+                <a16:creationId xmlns:a16="http://schemas.microsoft.com/office/drawing/2014/main" id="{B996DE10-D473-409B-B43C-F5464A8B73C0}"/>
+              </a:ext>
+            </a:extLst>
+          </p:cNvPr>
+          <p:cNvSpPr txBox="1"/>
+          <p:nvPr/>
+        </p:nvSpPr>
+        <p:spPr>
+          <a:xfrm>
+            <a:off x="119270" y="288235"/>
+            <a:ext cx="765313" cy="769441"/>
+          </a:xfrm>
+          <a:prstGeom prst="rect">
+            <a:avLst/>
+          </a:prstGeom>
+          <a:noFill/>
+        </p:spPr>
+        <p:txBody>
+          <a:bodyPr wrap="square" rtlCol="0">
+            <a:spAutoFit/>
+          </a:bodyPr>
+          <a:lstStyle/>
+          <a:p>
+            <a:r>
+              <a:rPr lang="en-US" sz="4400" dirty="0">
+                <a:latin typeface="Arial Rounded MT Bold" panose="020F0704030504030204" pitchFamily="34" charset="0"/>
+                <a:ea typeface="+mj-ea"/>
+                <a:cs typeface="+mj-cs"/>
+              </a:rPr>
+              <a:t>8</a:t>
+            </a:r>
+          </a:p>
+        </p:txBody>
+      </p:sp>
     </p:spTree>
     <p:extLst>
       <p:ext uri="{BB962C8B-B14F-4D97-AF65-F5344CB8AC3E}">
@@ -8070,6 +8811,45 @@
           </a:prstGeom>
         </p:spPr>
       </p:pic>
+      <p:sp>
+        <p:nvSpPr>
+          <p:cNvPr id="5" name="TextBox 4">
+            <a:extLst>
+              <a:ext uri="{FF2B5EF4-FFF2-40B4-BE49-F238E27FC236}">
+                <a16:creationId xmlns:a16="http://schemas.microsoft.com/office/drawing/2014/main" id="{F5C9C5A0-F42A-4B0D-88F4-E98AA80B4074}"/>
+              </a:ext>
+            </a:extLst>
+          </p:cNvPr>
+          <p:cNvSpPr txBox="1"/>
+          <p:nvPr/>
+        </p:nvSpPr>
+        <p:spPr>
+          <a:xfrm>
+            <a:off x="119270" y="288235"/>
+            <a:ext cx="765313" cy="769441"/>
+          </a:xfrm>
+          <a:prstGeom prst="rect">
+            <a:avLst/>
+          </a:prstGeom>
+          <a:noFill/>
+        </p:spPr>
+        <p:txBody>
+          <a:bodyPr wrap="square" rtlCol="0">
+            <a:spAutoFit/>
+          </a:bodyPr>
+          <a:lstStyle/>
+          <a:p>
+            <a:r>
+              <a:rPr lang="en-US" sz="4400" dirty="0">
+                <a:latin typeface="Arial Rounded MT Bold" panose="020F0704030504030204" pitchFamily="34" charset="0"/>
+                <a:ea typeface="+mj-ea"/>
+                <a:cs typeface="+mj-cs"/>
+              </a:rPr>
+              <a:t>9</a:t>
+            </a:r>
+          </a:p>
+        </p:txBody>
+      </p:sp>
     </p:spTree>
     <p:extLst>
       <p:ext uri="{BB962C8B-B14F-4D97-AF65-F5344CB8AC3E}">

</xml_diff>